<commit_message>
feature(creationIds): parse slide title from notes/header
</commit_message>
<xml_diff>
--- a/__tests__/pptx-templates/SlideWithTables.pptx
+++ b/__tests__/pptx-templates/SlideWithTables.pptx
@@ -260,7 +260,7 @@
           <a:p>
             <a:fld id="{8FB60A0F-5ED1-45ED-A5D5-DB038E6B70D9}" type="datetimeFigureOut">
               <a:rPr lang="de-DE" smtClean="0"/>
-              <a:t>01.04.2021</a:t>
+              <a:t>05.11.2021</a:t>
             </a:fld>
             <a:endParaRPr lang="de-DE"/>
           </a:p>
@@ -458,7 +458,7 @@
           <a:p>
             <a:fld id="{8FB60A0F-5ED1-45ED-A5D5-DB038E6B70D9}" type="datetimeFigureOut">
               <a:rPr lang="de-DE" smtClean="0"/>
-              <a:t>01.04.2021</a:t>
+              <a:t>05.11.2021</a:t>
             </a:fld>
             <a:endParaRPr lang="de-DE"/>
           </a:p>
@@ -666,7 +666,7 @@
           <a:p>
             <a:fld id="{8FB60A0F-5ED1-45ED-A5D5-DB038E6B70D9}" type="datetimeFigureOut">
               <a:rPr lang="de-DE" smtClean="0"/>
-              <a:t>01.04.2021</a:t>
+              <a:t>05.11.2021</a:t>
             </a:fld>
             <a:endParaRPr lang="de-DE"/>
           </a:p>
@@ -864,7 +864,7 @@
           <a:p>
             <a:fld id="{8FB60A0F-5ED1-45ED-A5D5-DB038E6B70D9}" type="datetimeFigureOut">
               <a:rPr lang="de-DE" smtClean="0"/>
-              <a:t>01.04.2021</a:t>
+              <a:t>05.11.2021</a:t>
             </a:fld>
             <a:endParaRPr lang="de-DE"/>
           </a:p>
@@ -1139,7 +1139,7 @@
           <a:p>
             <a:fld id="{8FB60A0F-5ED1-45ED-A5D5-DB038E6B70D9}" type="datetimeFigureOut">
               <a:rPr lang="de-DE" smtClean="0"/>
-              <a:t>01.04.2021</a:t>
+              <a:t>05.11.2021</a:t>
             </a:fld>
             <a:endParaRPr lang="de-DE"/>
           </a:p>
@@ -1404,7 +1404,7 @@
           <a:p>
             <a:fld id="{8FB60A0F-5ED1-45ED-A5D5-DB038E6B70D9}" type="datetimeFigureOut">
               <a:rPr lang="de-DE" smtClean="0"/>
-              <a:t>01.04.2021</a:t>
+              <a:t>05.11.2021</a:t>
             </a:fld>
             <a:endParaRPr lang="de-DE"/>
           </a:p>
@@ -1816,7 +1816,7 @@
           <a:p>
             <a:fld id="{8FB60A0F-5ED1-45ED-A5D5-DB038E6B70D9}" type="datetimeFigureOut">
               <a:rPr lang="de-DE" smtClean="0"/>
-              <a:t>01.04.2021</a:t>
+              <a:t>05.11.2021</a:t>
             </a:fld>
             <a:endParaRPr lang="de-DE"/>
           </a:p>
@@ -1957,7 +1957,7 @@
           <a:p>
             <a:fld id="{8FB60A0F-5ED1-45ED-A5D5-DB038E6B70D9}" type="datetimeFigureOut">
               <a:rPr lang="de-DE" smtClean="0"/>
-              <a:t>01.04.2021</a:t>
+              <a:t>05.11.2021</a:t>
             </a:fld>
             <a:endParaRPr lang="de-DE"/>
           </a:p>
@@ -2070,7 +2070,7 @@
           <a:p>
             <a:fld id="{8FB60A0F-5ED1-45ED-A5D5-DB038E6B70D9}" type="datetimeFigureOut">
               <a:rPr lang="de-DE" smtClean="0"/>
-              <a:t>01.04.2021</a:t>
+              <a:t>05.11.2021</a:t>
             </a:fld>
             <a:endParaRPr lang="de-DE"/>
           </a:p>
@@ -2381,7 +2381,7 @@
           <a:p>
             <a:fld id="{8FB60A0F-5ED1-45ED-A5D5-DB038E6B70D9}" type="datetimeFigureOut">
               <a:rPr lang="de-DE" smtClean="0"/>
-              <a:t>01.04.2021</a:t>
+              <a:t>05.11.2021</a:t>
             </a:fld>
             <a:endParaRPr lang="de-DE"/>
           </a:p>
@@ -2669,7 +2669,7 @@
           <a:p>
             <a:fld id="{8FB60A0F-5ED1-45ED-A5D5-DB038E6B70D9}" type="datetimeFigureOut">
               <a:rPr lang="de-DE" smtClean="0"/>
-              <a:t>01.04.2021</a:t>
+              <a:t>05.11.2021</a:t>
             </a:fld>
             <a:endParaRPr lang="de-DE"/>
           </a:p>
@@ -2910,7 +2910,7 @@
           <a:p>
             <a:fld id="{8FB60A0F-5ED1-45ED-A5D5-DB038E6B70D9}" type="datetimeFigureOut">
               <a:rPr lang="de-DE" smtClean="0"/>
-              <a:t>01.04.2021</a:t>
+              <a:t>05.11.2021</a:t>
             </a:fld>
             <a:endParaRPr lang="de-DE"/>
           </a:p>
@@ -4605,6 +4605,41 @@
           </a:graphicData>
         </a:graphic>
       </p:graphicFrame>
+      <p:sp>
+        <p:nvSpPr>
+          <p:cNvPr id="5" name="Titel 4">
+            <a:extLst>
+              <a:ext uri="{FF2B5EF4-FFF2-40B4-BE49-F238E27FC236}">
+                <a16:creationId xmlns:a16="http://schemas.microsoft.com/office/drawing/2014/main" id="{B8BB8EC6-C7DA-4E2F-86DF-BDE9856B03BD}"/>
+              </a:ext>
+            </a:extLst>
+          </p:cNvPr>
+          <p:cNvSpPr>
+            <a:spLocks noGrp="1"/>
+          </p:cNvSpPr>
+          <p:nvPr>
+            <p:ph type="title"/>
+          </p:nvPr>
+        </p:nvSpPr>
+        <p:spPr>
+          <a:xfrm>
+            <a:off x="0" y="24653"/>
+            <a:ext cx="10515600" cy="446405"/>
+          </a:xfrm>
+        </p:spPr>
+        <p:txBody>
+          <a:bodyPr>
+            <a:normAutofit/>
+          </a:bodyPr>
+          <a:lstStyle/>
+          <a:p>
+            <a:r>
+              <a:rPr lang="de-DE" sz="1400" b="1"/>
+              <a:t>Tabellen 1</a:t>
+            </a:r>
+          </a:p>
+        </p:txBody>
+      </p:sp>
     </p:spTree>
     <p:extLst>
       <p:ext uri="{BB962C8B-B14F-4D97-AF65-F5344CB8AC3E}">
@@ -5028,6 +5063,41 @@
           </a:graphicData>
         </a:graphic>
       </p:graphicFrame>
+      <p:sp>
+        <p:nvSpPr>
+          <p:cNvPr id="3" name="Titel 2">
+            <a:extLst>
+              <a:ext uri="{FF2B5EF4-FFF2-40B4-BE49-F238E27FC236}">
+                <a16:creationId xmlns:a16="http://schemas.microsoft.com/office/drawing/2014/main" id="{12AAF5B2-C516-40D5-AF97-17261F583D66}"/>
+              </a:ext>
+            </a:extLst>
+          </p:cNvPr>
+          <p:cNvSpPr>
+            <a:spLocks noGrp="1"/>
+          </p:cNvSpPr>
+          <p:nvPr>
+            <p:ph type="title"/>
+          </p:nvPr>
+        </p:nvSpPr>
+        <p:spPr>
+          <a:xfrm>
+            <a:off x="0" y="1"/>
+            <a:ext cx="10515600" cy="274320"/>
+          </a:xfrm>
+        </p:spPr>
+        <p:txBody>
+          <a:bodyPr>
+            <a:noAutofit/>
+          </a:bodyPr>
+          <a:lstStyle/>
+          <a:p>
+            <a:r>
+              <a:rPr lang="de-DE" sz="1600"/>
+              <a:t>Tabellen 2</a:t>
+            </a:r>
+          </a:p>
+        </p:txBody>
+      </p:sp>
     </p:spTree>
     <p:extLst>
       <p:ext uri="{BB962C8B-B14F-4D97-AF65-F5344CB8AC3E}">

</xml_diff>

<commit_message>
feature(xml): create text element if assertion failed
</commit_message>
<xml_diff>
--- a/__tests__/pptx-templates/SlideWithTables.pptx
+++ b/__tests__/pptx-templates/SlideWithTables.pptx
@@ -7,6 +7,7 @@
   <p:sldIdLst>
     <p:sldId id="257" r:id="rId2"/>
     <p:sldId id="258" r:id="rId3"/>
+    <p:sldId id="259" r:id="rId4"/>
   </p:sldIdLst>
   <p:sldSz cx="12192000" cy="6858000"/>
   <p:notesSz cx="6858000" cy="9144000"/>
@@ -260,7 +261,7 @@
           <a:p>
             <a:fld id="{8FB60A0F-5ED1-45ED-A5D5-DB038E6B70D9}" type="datetimeFigureOut">
               <a:rPr lang="de-DE" smtClean="0"/>
-              <a:t>05.11.2021</a:t>
+              <a:t>30.11.2021</a:t>
             </a:fld>
             <a:endParaRPr lang="de-DE"/>
           </a:p>
@@ -458,7 +459,7 @@
           <a:p>
             <a:fld id="{8FB60A0F-5ED1-45ED-A5D5-DB038E6B70D9}" type="datetimeFigureOut">
               <a:rPr lang="de-DE" smtClean="0"/>
-              <a:t>05.11.2021</a:t>
+              <a:t>30.11.2021</a:t>
             </a:fld>
             <a:endParaRPr lang="de-DE"/>
           </a:p>
@@ -666,7 +667,7 @@
           <a:p>
             <a:fld id="{8FB60A0F-5ED1-45ED-A5D5-DB038E6B70D9}" type="datetimeFigureOut">
               <a:rPr lang="de-DE" smtClean="0"/>
-              <a:t>05.11.2021</a:t>
+              <a:t>30.11.2021</a:t>
             </a:fld>
             <a:endParaRPr lang="de-DE"/>
           </a:p>
@@ -864,7 +865,7 @@
           <a:p>
             <a:fld id="{8FB60A0F-5ED1-45ED-A5D5-DB038E6B70D9}" type="datetimeFigureOut">
               <a:rPr lang="de-DE" smtClean="0"/>
-              <a:t>05.11.2021</a:t>
+              <a:t>30.11.2021</a:t>
             </a:fld>
             <a:endParaRPr lang="de-DE"/>
           </a:p>
@@ -1139,7 +1140,7 @@
           <a:p>
             <a:fld id="{8FB60A0F-5ED1-45ED-A5D5-DB038E6B70D9}" type="datetimeFigureOut">
               <a:rPr lang="de-DE" smtClean="0"/>
-              <a:t>05.11.2021</a:t>
+              <a:t>30.11.2021</a:t>
             </a:fld>
             <a:endParaRPr lang="de-DE"/>
           </a:p>
@@ -1404,7 +1405,7 @@
           <a:p>
             <a:fld id="{8FB60A0F-5ED1-45ED-A5D5-DB038E6B70D9}" type="datetimeFigureOut">
               <a:rPr lang="de-DE" smtClean="0"/>
-              <a:t>05.11.2021</a:t>
+              <a:t>30.11.2021</a:t>
             </a:fld>
             <a:endParaRPr lang="de-DE"/>
           </a:p>
@@ -1816,7 +1817,7 @@
           <a:p>
             <a:fld id="{8FB60A0F-5ED1-45ED-A5D5-DB038E6B70D9}" type="datetimeFigureOut">
               <a:rPr lang="de-DE" smtClean="0"/>
-              <a:t>05.11.2021</a:t>
+              <a:t>30.11.2021</a:t>
             </a:fld>
             <a:endParaRPr lang="de-DE"/>
           </a:p>
@@ -1957,7 +1958,7 @@
           <a:p>
             <a:fld id="{8FB60A0F-5ED1-45ED-A5D5-DB038E6B70D9}" type="datetimeFigureOut">
               <a:rPr lang="de-DE" smtClean="0"/>
-              <a:t>05.11.2021</a:t>
+              <a:t>30.11.2021</a:t>
             </a:fld>
             <a:endParaRPr lang="de-DE"/>
           </a:p>
@@ -2070,7 +2071,7 @@
           <a:p>
             <a:fld id="{8FB60A0F-5ED1-45ED-A5D5-DB038E6B70D9}" type="datetimeFigureOut">
               <a:rPr lang="de-DE" smtClean="0"/>
-              <a:t>05.11.2021</a:t>
+              <a:t>30.11.2021</a:t>
             </a:fld>
             <a:endParaRPr lang="de-DE"/>
           </a:p>
@@ -2381,7 +2382,7 @@
           <a:p>
             <a:fld id="{8FB60A0F-5ED1-45ED-A5D5-DB038E6B70D9}" type="datetimeFigureOut">
               <a:rPr lang="de-DE" smtClean="0"/>
-              <a:t>05.11.2021</a:t>
+              <a:t>30.11.2021</a:t>
             </a:fld>
             <a:endParaRPr lang="de-DE"/>
           </a:p>
@@ -2669,7 +2670,7 @@
           <a:p>
             <a:fld id="{8FB60A0F-5ED1-45ED-A5D5-DB038E6B70D9}" type="datetimeFigureOut">
               <a:rPr lang="de-DE" smtClean="0"/>
-              <a:t>05.11.2021</a:t>
+              <a:t>30.11.2021</a:t>
             </a:fld>
             <a:endParaRPr lang="de-DE"/>
           </a:p>
@@ -2910,7 +2911,7 @@
           <a:p>
             <a:fld id="{8FB60A0F-5ED1-45ED-A5D5-DB038E6B70D9}" type="datetimeFigureOut">
               <a:rPr lang="de-DE" smtClean="0"/>
-              <a:t>05.11.2021</a:t>
+              <a:t>30.11.2021</a:t>
             </a:fld>
             <a:endParaRPr lang="de-DE"/>
           </a:p>
@@ -5111,6 +5112,242 @@
 </p:sld>
 </file>
 
+<file path=ppt/slides/slide3.xml><?xml version="1.0" encoding="utf-8"?>
+<p:sld xmlns:a="http://schemas.openxmlformats.org/drawingml/2006/main" xmlns:r="http://schemas.openxmlformats.org/officeDocument/2006/relationships" xmlns:p="http://schemas.openxmlformats.org/presentationml/2006/main">
+  <p:cSld>
+    <p:spTree>
+      <p:nvGrpSpPr>
+        <p:cNvPr id="1" name=""/>
+        <p:cNvGrpSpPr/>
+        <p:nvPr/>
+      </p:nvGrpSpPr>
+      <p:grpSpPr>
+        <a:xfrm>
+          <a:off x="0" y="0"/>
+          <a:ext cx="0" cy="0"/>
+          <a:chOff x="0" y="0"/>
+          <a:chExt cx="0" cy="0"/>
+        </a:xfrm>
+      </p:grpSpPr>
+      <p:sp>
+        <p:nvSpPr>
+          <p:cNvPr id="3" name="Titel 2">
+            <a:extLst>
+              <a:ext uri="{FF2B5EF4-FFF2-40B4-BE49-F238E27FC236}">
+                <a16:creationId xmlns:a16="http://schemas.microsoft.com/office/drawing/2014/main" id="{12AAF5B2-C516-40D5-AF97-17261F583D66}"/>
+              </a:ext>
+            </a:extLst>
+          </p:cNvPr>
+          <p:cNvSpPr>
+            <a:spLocks noGrp="1"/>
+          </p:cNvSpPr>
+          <p:nvPr>
+            <p:ph type="title"/>
+          </p:nvPr>
+        </p:nvSpPr>
+        <p:spPr>
+          <a:xfrm>
+            <a:off x="0" y="1"/>
+            <a:ext cx="10515600" cy="274320"/>
+          </a:xfrm>
+        </p:spPr>
+        <p:txBody>
+          <a:bodyPr>
+            <a:noAutofit/>
+          </a:bodyPr>
+          <a:lstStyle/>
+          <a:p>
+            <a:r>
+              <a:rPr lang="de-DE" sz="1600"/>
+              <a:t>Tabellen 3</a:t>
+            </a:r>
+          </a:p>
+        </p:txBody>
+      </p:sp>
+      <p:graphicFrame>
+        <p:nvGraphicFramePr>
+          <p:cNvPr id="5" name="TableWithEmptyCells">
+            <a:extLst>
+              <a:ext uri="{FF2B5EF4-FFF2-40B4-BE49-F238E27FC236}">
+                <a16:creationId xmlns:a16="http://schemas.microsoft.com/office/drawing/2014/main" id="{B910329D-639A-4D4C-AFA1-E24A42C5007B}"/>
+              </a:ext>
+            </a:extLst>
+          </p:cNvPr>
+          <p:cNvGraphicFramePr>
+            <a:graphicFrameLocks noGrp="1"/>
+          </p:cNvGraphicFramePr>
+          <p:nvPr>
+            <p:extLst>
+              <p:ext uri="{D42A27DB-BD31-4B8C-83A1-F6EECF244321}">
+                <p14:modId xmlns:p14="http://schemas.microsoft.com/office/powerpoint/2010/main" val="1684247313"/>
+              </p:ext>
+            </p:extLst>
+          </p:nvPr>
+        </p:nvGraphicFramePr>
+        <p:xfrm>
+          <a:off x="725214" y="2229018"/>
+          <a:ext cx="5282033" cy="1112520"/>
+        </p:xfrm>
+        <a:graphic>
+          <a:graphicData uri="http://schemas.openxmlformats.org/drawingml/2006/table">
+            <a:tbl>
+              <a:tblPr bandRow="1">
+                <a:tableStyleId>{00A15C55-8517-42AA-B614-E9B94910E393}</a:tableStyleId>
+              </a:tblPr>
+              <a:tblGrid>
+                <a:gridCol w="3205655">
+                  <a:extLst>
+                    <a:ext uri="{9D8B030D-6E8A-4147-A177-3AD203B41FA5}">
+                      <a16:colId xmlns:a16="http://schemas.microsoft.com/office/drawing/2014/main" val="2081046437"/>
+                    </a:ext>
+                  </a:extLst>
+                </a:gridCol>
+                <a:gridCol w="2076378">
+                  <a:extLst>
+                    <a:ext uri="{9D8B030D-6E8A-4147-A177-3AD203B41FA5}">
+                      <a16:colId xmlns:a16="http://schemas.microsoft.com/office/drawing/2014/main" val="3700495073"/>
+                    </a:ext>
+                  </a:extLst>
+                </a:gridCol>
+              </a:tblGrid>
+              <a:tr h="370840">
+                <a:tc>
+                  <a:txBody>
+                    <a:bodyPr/>
+                    <a:lstStyle/>
+                    <a:p>
+                      <a:pPr algn="r"/>
+                      <a:r>
+                        <a:rPr kumimoji="0" lang="de-DE" sz="1400" b="1" u="none" strike="noStrike" kern="1200" cap="none" spc="0" normalizeH="0" baseline="0" noProof="0">
+                          <a:ln>
+                            <a:noFill/>
+                          </a:ln>
+                          <a:effectLst/>
+                          <a:uLnTx/>
+                          <a:uFillTx/>
+                        </a:rPr>
+                        <a:t>label</a:t>
+                      </a:r>
+                      <a:endParaRPr lang="de-DE" sz="1400" b="1">
+                        <a:latin typeface="+mn-lt"/>
+                      </a:endParaRPr>
+                    </a:p>
+                  </a:txBody>
+                  <a:tcPr/>
+                </a:tc>
+                <a:tc>
+                  <a:txBody>
+                    <a:bodyPr/>
+                    <a:lstStyle/>
+                    <a:p>
+                      <a:pPr algn="ctr"/>
+                      <a:endParaRPr lang="de-DE" sz="1400">
+                        <a:latin typeface="+mn-lt"/>
+                      </a:endParaRPr>
+                    </a:p>
+                  </a:txBody>
+                  <a:tcPr/>
+                </a:tc>
+                <a:extLst>
+                  <a:ext uri="{0D108BD9-81ED-4DB2-BD59-A6C34878D82A}">
+                    <a16:rowId xmlns:a16="http://schemas.microsoft.com/office/drawing/2014/main" val="1523742880"/>
+                  </a:ext>
+                </a:extLst>
+              </a:tr>
+              <a:tr h="370840">
+                <a:tc>
+                  <a:txBody>
+                    <a:bodyPr/>
+                    <a:lstStyle/>
+                    <a:p>
+                      <a:pPr algn="r"/>
+                      <a:r>
+                        <a:rPr kumimoji="0" lang="de-DE" sz="1400" b="1" u="none" strike="noStrike" kern="1200" cap="none" spc="0" normalizeH="0" baseline="0" noProof="0">
+                          <a:ln>
+                            <a:noFill/>
+                          </a:ln>
+                          <a:effectLst/>
+                          <a:uLnTx/>
+                          <a:uFillTx/>
+                        </a:rPr>
+                        <a:t>label</a:t>
+                      </a:r>
+                      <a:endParaRPr lang="de-DE" sz="1400" b="1">
+                        <a:latin typeface="+mn-lt"/>
+                      </a:endParaRPr>
+                    </a:p>
+                  </a:txBody>
+                  <a:tcPr/>
+                </a:tc>
+                <a:tc>
+                  <a:txBody>
+                    <a:bodyPr/>
+                    <a:lstStyle/>
+                    <a:p>
+                      <a:pPr algn="ctr"/>
+                      <a:endParaRPr lang="de-DE" sz="1400">
+                        <a:latin typeface="+mn-lt"/>
+                      </a:endParaRPr>
+                    </a:p>
+                  </a:txBody>
+                  <a:tcPr/>
+                </a:tc>
+                <a:extLst>
+                  <a:ext uri="{0D108BD9-81ED-4DB2-BD59-A6C34878D82A}">
+                    <a16:rowId xmlns:a16="http://schemas.microsoft.com/office/drawing/2014/main" val="3580438174"/>
+                  </a:ext>
+                </a:extLst>
+              </a:tr>
+              <a:tr h="370840">
+                <a:tc>
+                  <a:txBody>
+                    <a:bodyPr/>
+                    <a:lstStyle/>
+                    <a:p>
+                      <a:pPr algn="r"/>
+                      <a:endParaRPr lang="de-DE" sz="1400" b="1">
+                        <a:latin typeface="+mn-lt"/>
+                      </a:endParaRPr>
+                    </a:p>
+                  </a:txBody>
+                  <a:tcPr/>
+                </a:tc>
+                <a:tc>
+                  <a:txBody>
+                    <a:bodyPr/>
+                    <a:lstStyle/>
+                    <a:p>
+                      <a:pPr algn="ctr"/>
+                      <a:endParaRPr lang="de-DE" sz="1400">
+                        <a:latin typeface="+mn-lt"/>
+                      </a:endParaRPr>
+                    </a:p>
+                  </a:txBody>
+                  <a:tcPr/>
+                </a:tc>
+                <a:extLst>
+                  <a:ext uri="{0D108BD9-81ED-4DB2-BD59-A6C34878D82A}">
+                    <a16:rowId xmlns:a16="http://schemas.microsoft.com/office/drawing/2014/main" val="625084061"/>
+                  </a:ext>
+                </a:extLst>
+              </a:tr>
+            </a:tbl>
+          </a:graphicData>
+        </a:graphic>
+      </p:graphicFrame>
+    </p:spTree>
+    <p:extLst>
+      <p:ext uri="{BB962C8B-B14F-4D97-AF65-F5344CB8AC3E}">
+        <p14:creationId xmlns:p14="http://schemas.microsoft.com/office/powerpoint/2010/main" val="4161669894"/>
+      </p:ext>
+    </p:extLst>
+  </p:cSld>
+  <p:clrMapOvr>
+    <a:masterClrMapping/>
+  </p:clrMapOvr>
+</p:sld>
+</file>
+
 <file path=ppt/theme/theme1.xml><?xml version="1.0" encoding="utf-8"?>
 <a:theme xmlns:a="http://schemas.openxmlformats.org/drawingml/2006/main" name="Office">
   <a:themeElements>

</xml_diff>

<commit_message>
chore(test): add example for table cell formatting (#77)
</commit_message>
<xml_diff>
--- a/__tests__/pptx-templates/SlideWithTables.pptx
+++ b/__tests__/pptx-templates/SlideWithTables.pptx
@@ -261,7 +261,7 @@
           <a:p>
             <a:fld id="{8FB60A0F-5ED1-45ED-A5D5-DB038E6B70D9}" type="datetimeFigureOut">
               <a:rPr lang="de-DE" smtClean="0"/>
-              <a:t>30.11.2021</a:t>
+              <a:t>24.10.2023</a:t>
             </a:fld>
             <a:endParaRPr lang="de-DE"/>
           </a:p>
@@ -459,7 +459,7 @@
           <a:p>
             <a:fld id="{8FB60A0F-5ED1-45ED-A5D5-DB038E6B70D9}" type="datetimeFigureOut">
               <a:rPr lang="de-DE" smtClean="0"/>
-              <a:t>30.11.2021</a:t>
+              <a:t>24.10.2023</a:t>
             </a:fld>
             <a:endParaRPr lang="de-DE"/>
           </a:p>
@@ -667,7 +667,7 @@
           <a:p>
             <a:fld id="{8FB60A0F-5ED1-45ED-A5D5-DB038E6B70D9}" type="datetimeFigureOut">
               <a:rPr lang="de-DE" smtClean="0"/>
-              <a:t>30.11.2021</a:t>
+              <a:t>24.10.2023</a:t>
             </a:fld>
             <a:endParaRPr lang="de-DE"/>
           </a:p>
@@ -865,7 +865,7 @@
           <a:p>
             <a:fld id="{8FB60A0F-5ED1-45ED-A5D5-DB038E6B70D9}" type="datetimeFigureOut">
               <a:rPr lang="de-DE" smtClean="0"/>
-              <a:t>30.11.2021</a:t>
+              <a:t>24.10.2023</a:t>
             </a:fld>
             <a:endParaRPr lang="de-DE"/>
           </a:p>
@@ -1140,7 +1140,7 @@
           <a:p>
             <a:fld id="{8FB60A0F-5ED1-45ED-A5D5-DB038E6B70D9}" type="datetimeFigureOut">
               <a:rPr lang="de-DE" smtClean="0"/>
-              <a:t>30.11.2021</a:t>
+              <a:t>24.10.2023</a:t>
             </a:fld>
             <a:endParaRPr lang="de-DE"/>
           </a:p>
@@ -1405,7 +1405,7 @@
           <a:p>
             <a:fld id="{8FB60A0F-5ED1-45ED-A5D5-DB038E6B70D9}" type="datetimeFigureOut">
               <a:rPr lang="de-DE" smtClean="0"/>
-              <a:t>30.11.2021</a:t>
+              <a:t>24.10.2023</a:t>
             </a:fld>
             <a:endParaRPr lang="de-DE"/>
           </a:p>
@@ -1817,7 +1817,7 @@
           <a:p>
             <a:fld id="{8FB60A0F-5ED1-45ED-A5D5-DB038E6B70D9}" type="datetimeFigureOut">
               <a:rPr lang="de-DE" smtClean="0"/>
-              <a:t>30.11.2021</a:t>
+              <a:t>24.10.2023</a:t>
             </a:fld>
             <a:endParaRPr lang="de-DE"/>
           </a:p>
@@ -1958,7 +1958,7 @@
           <a:p>
             <a:fld id="{8FB60A0F-5ED1-45ED-A5D5-DB038E6B70D9}" type="datetimeFigureOut">
               <a:rPr lang="de-DE" smtClean="0"/>
-              <a:t>30.11.2021</a:t>
+              <a:t>24.10.2023</a:t>
             </a:fld>
             <a:endParaRPr lang="de-DE"/>
           </a:p>
@@ -2071,7 +2071,7 @@
           <a:p>
             <a:fld id="{8FB60A0F-5ED1-45ED-A5D5-DB038E6B70D9}" type="datetimeFigureOut">
               <a:rPr lang="de-DE" smtClean="0"/>
-              <a:t>30.11.2021</a:t>
+              <a:t>24.10.2023</a:t>
             </a:fld>
             <a:endParaRPr lang="de-DE"/>
           </a:p>
@@ -2382,7 +2382,7 @@
           <a:p>
             <a:fld id="{8FB60A0F-5ED1-45ED-A5D5-DB038E6B70D9}" type="datetimeFigureOut">
               <a:rPr lang="de-DE" smtClean="0"/>
-              <a:t>30.11.2021</a:t>
+              <a:t>24.10.2023</a:t>
             </a:fld>
             <a:endParaRPr lang="de-DE"/>
           </a:p>
@@ -2670,7 +2670,7 @@
           <a:p>
             <a:fld id="{8FB60A0F-5ED1-45ED-A5D5-DB038E6B70D9}" type="datetimeFigureOut">
               <a:rPr lang="de-DE" smtClean="0"/>
-              <a:t>30.11.2021</a:t>
+              <a:t>24.10.2023</a:t>
             </a:fld>
             <a:endParaRPr lang="de-DE"/>
           </a:p>
@@ -2911,7 +2911,7 @@
           <a:p>
             <a:fld id="{8FB60A0F-5ED1-45ED-A5D5-DB038E6B70D9}" type="datetimeFigureOut">
               <a:rPr lang="de-DE" smtClean="0"/>
-              <a:t>30.11.2021</a:t>
+              <a:t>24.10.2023</a:t>
             </a:fld>
             <a:endParaRPr lang="de-DE"/>
           </a:p>
@@ -5179,7 +5179,7 @@
           <p:nvPr>
             <p:extLst>
               <p:ext uri="{D42A27DB-BD31-4B8C-83A1-F6EECF244321}">
-                <p14:modId xmlns:p14="http://schemas.microsoft.com/office/powerpoint/2010/main" val="1684247313"/>
+                <p14:modId xmlns:p14="http://schemas.microsoft.com/office/powerpoint/2010/main" val="1200315331"/>
               </p:ext>
             </p:extLst>
           </p:nvPr>
@@ -5324,6 +5324,377 @@
                     </a:p>
                   </a:txBody>
                   <a:tcPr/>
+                </a:tc>
+                <a:extLst>
+                  <a:ext uri="{0D108BD9-81ED-4DB2-BD59-A6C34878D82A}">
+                    <a16:rowId xmlns:a16="http://schemas.microsoft.com/office/drawing/2014/main" val="625084061"/>
+                  </a:ext>
+                </a:extLst>
+              </a:tr>
+            </a:tbl>
+          </a:graphicData>
+        </a:graphic>
+      </p:graphicFrame>
+      <p:graphicFrame>
+        <p:nvGraphicFramePr>
+          <p:cNvPr id="4" name="TableWithFormattedCells">
+            <a:extLst>
+              <a:ext uri="{FF2B5EF4-FFF2-40B4-BE49-F238E27FC236}">
+                <a16:creationId xmlns:a16="http://schemas.microsoft.com/office/drawing/2014/main" id="{D6A9B1E4-64EE-4DE8-A221-6B914713096F}"/>
+              </a:ext>
+            </a:extLst>
+          </p:cNvPr>
+          <p:cNvGraphicFramePr>
+            <a:graphicFrameLocks noGrp="1"/>
+          </p:cNvGraphicFramePr>
+          <p:nvPr>
+            <p:extLst>
+              <p:ext uri="{D42A27DB-BD31-4B8C-83A1-F6EECF244321}">
+                <p14:modId xmlns:p14="http://schemas.microsoft.com/office/powerpoint/2010/main" val="2827932048"/>
+              </p:ext>
+            </p:extLst>
+          </p:nvPr>
+        </p:nvGraphicFramePr>
+        <p:xfrm>
+          <a:off x="6740531" y="2229018"/>
+          <a:ext cx="5282033" cy="1112520"/>
+        </p:xfrm>
+        <a:graphic>
+          <a:graphicData uri="http://schemas.openxmlformats.org/drawingml/2006/table">
+            <a:tbl>
+              <a:tblPr bandRow="1">
+                <a:tableStyleId>{00A15C55-8517-42AA-B614-E9B94910E393}</a:tableStyleId>
+              </a:tblPr>
+              <a:tblGrid>
+                <a:gridCol w="2609657">
+                  <a:extLst>
+                    <a:ext uri="{9D8B030D-6E8A-4147-A177-3AD203B41FA5}">
+                      <a16:colId xmlns:a16="http://schemas.microsoft.com/office/drawing/2014/main" val="2081046437"/>
+                    </a:ext>
+                  </a:extLst>
+                </a:gridCol>
+                <a:gridCol w="2672376">
+                  <a:extLst>
+                    <a:ext uri="{9D8B030D-6E8A-4147-A177-3AD203B41FA5}">
+                      <a16:colId xmlns:a16="http://schemas.microsoft.com/office/drawing/2014/main" val="3700495073"/>
+                    </a:ext>
+                  </a:extLst>
+                </a:gridCol>
+              </a:tblGrid>
+              <a:tr h="370840">
+                <a:tc>
+                  <a:txBody>
+                    <a:bodyPr/>
+                    <a:lstStyle/>
+                    <a:p>
+                      <a:pPr marL="0" marR="0" lvl="0" indent="0" algn="ctr" defTabSz="914400" rtl="0" eaLnBrk="1" fontAlgn="auto" latinLnBrk="0" hangingPunct="1">
+                        <a:lnSpc>
+                          <a:spcPct val="100000"/>
+                        </a:lnSpc>
+                        <a:spcBef>
+                          <a:spcPts val="0"/>
+                        </a:spcBef>
+                        <a:spcAft>
+                          <a:spcPts val="0"/>
+                        </a:spcAft>
+                        <a:buClrTx/>
+                        <a:buSzTx/>
+                        <a:buFontTx/>
+                        <a:buNone/>
+                        <a:tabLst/>
+                        <a:defRPr/>
+                      </a:pPr>
+                      <a:r>
+                        <a:rPr kumimoji="0" lang="de-DE" sz="1400" b="1" i="0" u="none" strike="noStrike" kern="1200" cap="none" spc="0" normalizeH="0" baseline="0" noProof="0">
+                          <a:ln>
+                            <a:noFill/>
+                          </a:ln>
+                          <a:solidFill>
+                            <a:srgbClr val="979696"/>
+                          </a:solidFill>
+                          <a:effectLst/>
+                          <a:uLnTx/>
+                          <a:uFillTx/>
+                          <a:latin typeface="Calibri" panose="020F0502020204030204"/>
+                          <a:ea typeface="+mn-ea"/>
+                          <a:cs typeface="+mn-cs"/>
+                        </a:rPr>
+                        <a:t>cell</a:t>
+                      </a:r>
+                    </a:p>
+                  </a:txBody>
+                  <a:tcPr>
+                    <a:solidFill>
+                      <a:schemeClr val="accent3">
+                        <a:lumMod val="60000"/>
+                        <a:lumOff val="40000"/>
+                      </a:schemeClr>
+                    </a:solidFill>
+                  </a:tcPr>
+                </a:tc>
+                <a:tc>
+                  <a:txBody>
+                    <a:bodyPr/>
+                    <a:lstStyle/>
+                    <a:p>
+                      <a:pPr marL="0" marR="0" lvl="0" indent="0" algn="ctr" defTabSz="914400" rtl="0" eaLnBrk="1" fontAlgn="auto" latinLnBrk="0" hangingPunct="1">
+                        <a:lnSpc>
+                          <a:spcPct val="100000"/>
+                        </a:lnSpc>
+                        <a:spcBef>
+                          <a:spcPts val="0"/>
+                        </a:spcBef>
+                        <a:spcAft>
+                          <a:spcPts val="0"/>
+                        </a:spcAft>
+                        <a:buClrTx/>
+                        <a:buSzTx/>
+                        <a:buFontTx/>
+                        <a:buNone/>
+                        <a:tabLst/>
+                        <a:defRPr/>
+                      </a:pPr>
+                      <a:r>
+                        <a:rPr kumimoji="0" lang="de-DE" sz="1400" b="1" i="0" u="none" strike="noStrike" kern="1200" cap="none" spc="0" normalizeH="0" baseline="0" noProof="0">
+                          <a:ln>
+                            <a:noFill/>
+                          </a:ln>
+                          <a:solidFill>
+                            <a:srgbClr val="979696"/>
+                          </a:solidFill>
+                          <a:effectLst/>
+                          <a:uLnTx/>
+                          <a:uFillTx/>
+                          <a:latin typeface="Calibri" panose="020F0502020204030204"/>
+                          <a:ea typeface="+mn-ea"/>
+                          <a:cs typeface="+mn-cs"/>
+                        </a:rPr>
+                        <a:t>cell</a:t>
+                      </a:r>
+                    </a:p>
+                  </a:txBody>
+                  <a:tcPr>
+                    <a:solidFill>
+                      <a:schemeClr val="accent3">
+                        <a:lumMod val="60000"/>
+                        <a:lumOff val="40000"/>
+                      </a:schemeClr>
+                    </a:solidFill>
+                  </a:tcPr>
+                </a:tc>
+                <a:extLst>
+                  <a:ext uri="{0D108BD9-81ED-4DB2-BD59-A6C34878D82A}">
+                    <a16:rowId xmlns:a16="http://schemas.microsoft.com/office/drawing/2014/main" val="1523742880"/>
+                  </a:ext>
+                </a:extLst>
+              </a:tr>
+              <a:tr h="370840">
+                <a:tc>
+                  <a:txBody>
+                    <a:bodyPr/>
+                    <a:lstStyle/>
+                    <a:p>
+                      <a:pPr marL="0" marR="0" lvl="0" indent="0" algn="ctr" defTabSz="914400" rtl="0" eaLnBrk="1" fontAlgn="auto" latinLnBrk="0" hangingPunct="1">
+                        <a:lnSpc>
+                          <a:spcPct val="100000"/>
+                        </a:lnSpc>
+                        <a:spcBef>
+                          <a:spcPts val="0"/>
+                        </a:spcBef>
+                        <a:spcAft>
+                          <a:spcPts val="0"/>
+                        </a:spcAft>
+                        <a:buClrTx/>
+                        <a:buSzTx/>
+                        <a:buFontTx/>
+                        <a:buNone/>
+                        <a:tabLst/>
+                        <a:defRPr/>
+                      </a:pPr>
+                      <a:r>
+                        <a:rPr kumimoji="0" lang="de-DE" sz="1400" b="1" i="0" u="none" strike="noStrike" kern="1200" cap="none" spc="0" normalizeH="0" baseline="0" noProof="0">
+                          <a:ln>
+                            <a:noFill/>
+                          </a:ln>
+                          <a:solidFill>
+                            <a:srgbClr val="979696"/>
+                          </a:solidFill>
+                          <a:effectLst/>
+                          <a:uLnTx/>
+                          <a:uFillTx/>
+                          <a:latin typeface="Calibri" panose="020F0502020204030204"/>
+                          <a:ea typeface="+mn-ea"/>
+                          <a:cs typeface="+mn-cs"/>
+                        </a:rPr>
+                        <a:t>cell</a:t>
+                      </a:r>
+                    </a:p>
+                  </a:txBody>
+                  <a:tcPr>
+                    <a:solidFill>
+                      <a:schemeClr val="accent3">
+                        <a:lumMod val="60000"/>
+                        <a:lumOff val="40000"/>
+                      </a:schemeClr>
+                    </a:solidFill>
+                  </a:tcPr>
+                </a:tc>
+                <a:tc>
+                  <a:txBody>
+                    <a:bodyPr/>
+                    <a:lstStyle/>
+                    <a:p>
+                      <a:pPr marL="0" marR="0" lvl="0" indent="0" algn="ctr" defTabSz="914400" rtl="0" eaLnBrk="1" fontAlgn="auto" latinLnBrk="0" hangingPunct="1">
+                        <a:lnSpc>
+                          <a:spcPct val="100000"/>
+                        </a:lnSpc>
+                        <a:spcBef>
+                          <a:spcPts val="0"/>
+                        </a:spcBef>
+                        <a:spcAft>
+                          <a:spcPts val="0"/>
+                        </a:spcAft>
+                        <a:buClrTx/>
+                        <a:buSzTx/>
+                        <a:buFontTx/>
+                        <a:buNone/>
+                        <a:tabLst/>
+                        <a:defRPr/>
+                      </a:pPr>
+                      <a:r>
+                        <a:rPr kumimoji="0" lang="de-DE" sz="1400" b="1" i="0" u="none" strike="noStrike" kern="1200" cap="none" spc="0" normalizeH="0" baseline="0" noProof="0">
+                          <a:ln>
+                            <a:noFill/>
+                          </a:ln>
+                          <a:solidFill>
+                            <a:srgbClr val="979696"/>
+                          </a:solidFill>
+                          <a:effectLst/>
+                          <a:uLnTx/>
+                          <a:uFillTx/>
+                          <a:latin typeface="Calibri" panose="020F0502020204030204"/>
+                          <a:ea typeface="+mn-ea"/>
+                          <a:cs typeface="+mn-cs"/>
+                        </a:rPr>
+                        <a:t>cell</a:t>
+                      </a:r>
+                    </a:p>
+                  </a:txBody>
+                  <a:tcPr>
+                    <a:solidFill>
+                      <a:schemeClr val="accent3">
+                        <a:lumMod val="60000"/>
+                        <a:lumOff val="40000"/>
+                      </a:schemeClr>
+                    </a:solidFill>
+                  </a:tcPr>
+                </a:tc>
+                <a:extLst>
+                  <a:ext uri="{0D108BD9-81ED-4DB2-BD59-A6C34878D82A}">
+                    <a16:rowId xmlns:a16="http://schemas.microsoft.com/office/drawing/2014/main" val="3580438174"/>
+                  </a:ext>
+                </a:extLst>
+              </a:tr>
+              <a:tr h="370840">
+                <a:tc>
+                  <a:txBody>
+                    <a:bodyPr/>
+                    <a:lstStyle/>
+                    <a:p>
+                      <a:pPr marL="0" marR="0" lvl="0" indent="0" algn="ctr" defTabSz="914400" rtl="0" eaLnBrk="1" fontAlgn="auto" latinLnBrk="0" hangingPunct="1">
+                        <a:lnSpc>
+                          <a:spcPct val="100000"/>
+                        </a:lnSpc>
+                        <a:spcBef>
+                          <a:spcPts val="0"/>
+                        </a:spcBef>
+                        <a:spcAft>
+                          <a:spcPts val="0"/>
+                        </a:spcAft>
+                        <a:buClrTx/>
+                        <a:buSzTx/>
+                        <a:buFontTx/>
+                        <a:buNone/>
+                        <a:tabLst/>
+                        <a:defRPr/>
+                      </a:pPr>
+                      <a:r>
+                        <a:rPr kumimoji="0" lang="de-DE" sz="1400" b="1" i="0" u="none" strike="noStrike" kern="1200" cap="none" spc="0" normalizeH="0" baseline="0" noProof="0">
+                          <a:ln>
+                            <a:noFill/>
+                          </a:ln>
+                          <a:solidFill>
+                            <a:srgbClr val="979696"/>
+                          </a:solidFill>
+                          <a:effectLst/>
+                          <a:uLnTx/>
+                          <a:uFillTx/>
+                          <a:latin typeface="Calibri" panose="020F0502020204030204"/>
+                          <a:ea typeface="+mn-ea"/>
+                          <a:cs typeface="+mn-cs"/>
+                        </a:rPr>
+                        <a:t>cell</a:t>
+                      </a:r>
+                    </a:p>
+                  </a:txBody>
+                  <a:tcPr>
+                    <a:solidFill>
+                      <a:schemeClr val="accent3">
+                        <a:lumMod val="60000"/>
+                        <a:lumOff val="40000"/>
+                      </a:schemeClr>
+                    </a:solidFill>
+                  </a:tcPr>
+                </a:tc>
+                <a:tc>
+                  <a:txBody>
+                    <a:bodyPr/>
+                    <a:lstStyle/>
+                    <a:p>
+                      <a:pPr marL="0" marR="0" lvl="0" indent="0" algn="ctr" defTabSz="914400" rtl="0" eaLnBrk="1" fontAlgn="auto" latinLnBrk="0" hangingPunct="1">
+                        <a:lnSpc>
+                          <a:spcPct val="100000"/>
+                        </a:lnSpc>
+                        <a:spcBef>
+                          <a:spcPts val="0"/>
+                        </a:spcBef>
+                        <a:spcAft>
+                          <a:spcPts val="0"/>
+                        </a:spcAft>
+                        <a:buClrTx/>
+                        <a:buSzTx/>
+                        <a:buFontTx/>
+                        <a:buNone/>
+                        <a:tabLst/>
+                        <a:defRPr/>
+                      </a:pPr>
+                      <a:r>
+                        <a:rPr kumimoji="0" lang="de-DE" sz="1400" b="1" i="0" u="none" strike="noStrike" kern="1200" cap="none" spc="0" normalizeH="0" baseline="0" noProof="0">
+                          <a:ln>
+                            <a:noFill/>
+                          </a:ln>
+                          <a:solidFill>
+                            <a:srgbClr val="979696"/>
+                          </a:solidFill>
+                          <a:effectLst/>
+                          <a:uLnTx/>
+                          <a:uFillTx/>
+                          <a:latin typeface="Calibri" panose="020F0502020204030204"/>
+                          <a:ea typeface="+mn-ea"/>
+                          <a:cs typeface="+mn-cs"/>
+                        </a:rPr>
+                        <a:t>cell</a:t>
+                      </a:r>
+                    </a:p>
+                  </a:txBody>
+                  <a:tcPr>
+                    <a:solidFill>
+                      <a:schemeClr val="accent3">
+                        <a:lumMod val="60000"/>
+                        <a:lumOff val="40000"/>
+                      </a:schemeClr>
+                    </a:solidFill>
+                  </a:tcPr>
                 </a:tc>
                 <a:extLst>
                   <a:ext uri="{0D108BD9-81ED-4DB2-BD59-A6C34878D82A}">

</xml_diff>

<commit_message>
fix(table): add test for table cell without <a:p> #112
</commit_message>
<xml_diff>
--- a/__tests__/pptx-templates/SlideWithTables.pptx
+++ b/__tests__/pptx-templates/SlideWithTables.pptx
@@ -261,7 +261,7 @@
           <a:p>
             <a:fld id="{8FB60A0F-5ED1-45ED-A5D5-DB038E6B70D9}" type="datetimeFigureOut">
               <a:rPr lang="de-DE" smtClean="0"/>
-              <a:t>24.10.2023</a:t>
+              <a:t>02.08.2024</a:t>
             </a:fld>
             <a:endParaRPr lang="de-DE"/>
           </a:p>
@@ -459,7 +459,7 @@
           <a:p>
             <a:fld id="{8FB60A0F-5ED1-45ED-A5D5-DB038E6B70D9}" type="datetimeFigureOut">
               <a:rPr lang="de-DE" smtClean="0"/>
-              <a:t>24.10.2023</a:t>
+              <a:t>02.08.2024</a:t>
             </a:fld>
             <a:endParaRPr lang="de-DE"/>
           </a:p>
@@ -667,7 +667,7 @@
           <a:p>
             <a:fld id="{8FB60A0F-5ED1-45ED-A5D5-DB038E6B70D9}" type="datetimeFigureOut">
               <a:rPr lang="de-DE" smtClean="0"/>
-              <a:t>24.10.2023</a:t>
+              <a:t>02.08.2024</a:t>
             </a:fld>
             <a:endParaRPr lang="de-DE"/>
           </a:p>
@@ -865,7 +865,7 @@
           <a:p>
             <a:fld id="{8FB60A0F-5ED1-45ED-A5D5-DB038E6B70D9}" type="datetimeFigureOut">
               <a:rPr lang="de-DE" smtClean="0"/>
-              <a:t>24.10.2023</a:t>
+              <a:t>02.08.2024</a:t>
             </a:fld>
             <a:endParaRPr lang="de-DE"/>
           </a:p>
@@ -1140,7 +1140,7 @@
           <a:p>
             <a:fld id="{8FB60A0F-5ED1-45ED-A5D5-DB038E6B70D9}" type="datetimeFigureOut">
               <a:rPr lang="de-DE" smtClean="0"/>
-              <a:t>24.10.2023</a:t>
+              <a:t>02.08.2024</a:t>
             </a:fld>
             <a:endParaRPr lang="de-DE"/>
           </a:p>
@@ -1405,7 +1405,7 @@
           <a:p>
             <a:fld id="{8FB60A0F-5ED1-45ED-A5D5-DB038E6B70D9}" type="datetimeFigureOut">
               <a:rPr lang="de-DE" smtClean="0"/>
-              <a:t>24.10.2023</a:t>
+              <a:t>02.08.2024</a:t>
             </a:fld>
             <a:endParaRPr lang="de-DE"/>
           </a:p>
@@ -1817,7 +1817,7 @@
           <a:p>
             <a:fld id="{8FB60A0F-5ED1-45ED-A5D5-DB038E6B70D9}" type="datetimeFigureOut">
               <a:rPr lang="de-DE" smtClean="0"/>
-              <a:t>24.10.2023</a:t>
+              <a:t>02.08.2024</a:t>
             </a:fld>
             <a:endParaRPr lang="de-DE"/>
           </a:p>
@@ -1958,7 +1958,7 @@
           <a:p>
             <a:fld id="{8FB60A0F-5ED1-45ED-A5D5-DB038E6B70D9}" type="datetimeFigureOut">
               <a:rPr lang="de-DE" smtClean="0"/>
-              <a:t>24.10.2023</a:t>
+              <a:t>02.08.2024</a:t>
             </a:fld>
             <a:endParaRPr lang="de-DE"/>
           </a:p>
@@ -2071,7 +2071,7 @@
           <a:p>
             <a:fld id="{8FB60A0F-5ED1-45ED-A5D5-DB038E6B70D9}" type="datetimeFigureOut">
               <a:rPr lang="de-DE" smtClean="0"/>
-              <a:t>24.10.2023</a:t>
+              <a:t>02.08.2024</a:t>
             </a:fld>
             <a:endParaRPr lang="de-DE"/>
           </a:p>
@@ -2382,7 +2382,7 @@
           <a:p>
             <a:fld id="{8FB60A0F-5ED1-45ED-A5D5-DB038E6B70D9}" type="datetimeFigureOut">
               <a:rPr lang="de-DE" smtClean="0"/>
-              <a:t>24.10.2023</a:t>
+              <a:t>02.08.2024</a:t>
             </a:fld>
             <a:endParaRPr lang="de-DE"/>
           </a:p>
@@ -2670,7 +2670,7 @@
           <a:p>
             <a:fld id="{8FB60A0F-5ED1-45ED-A5D5-DB038E6B70D9}" type="datetimeFigureOut">
               <a:rPr lang="de-DE" smtClean="0"/>
-              <a:t>24.10.2023</a:t>
+              <a:t>02.08.2024</a:t>
             </a:fld>
             <a:endParaRPr lang="de-DE"/>
           </a:p>
@@ -2911,7 +2911,7 @@
           <a:p>
             <a:fld id="{8FB60A0F-5ED1-45ED-A5D5-DB038E6B70D9}" type="datetimeFigureOut">
               <a:rPr lang="de-DE" smtClean="0"/>
-              <a:t>24.10.2023</a:t>
+              <a:t>02.08.2024</a:t>
             </a:fld>
             <a:endParaRPr lang="de-DE"/>
           </a:p>
@@ -5706,6 +5706,137 @@
           </a:graphicData>
         </a:graphic>
       </p:graphicFrame>
+      <p:graphicFrame>
+        <p:nvGraphicFramePr>
+          <p:cNvPr id="2" name="EmptyTable">
+            <a:extLst>
+              <a:ext uri="{FF2B5EF4-FFF2-40B4-BE49-F238E27FC236}">
+                <a16:creationId xmlns:a16="http://schemas.microsoft.com/office/drawing/2014/main" id="{1398062B-485E-4FEE-8368-01AB33F0B1ED}"/>
+              </a:ext>
+            </a:extLst>
+          </p:cNvPr>
+          <p:cNvGraphicFramePr>
+            <a:graphicFrameLocks noGrp="1"/>
+          </p:cNvGraphicFramePr>
+          <p:nvPr>
+            <p:extLst>
+              <p:ext uri="{D42A27DB-BD31-4B8C-83A1-F6EECF244321}">
+                <p14:modId xmlns:p14="http://schemas.microsoft.com/office/powerpoint/2010/main" val="1809789567"/>
+              </p:ext>
+            </p:extLst>
+          </p:nvPr>
+        </p:nvGraphicFramePr>
+        <p:xfrm>
+          <a:off x="2032000" y="4400415"/>
+          <a:ext cx="8127999" cy="741680"/>
+        </p:xfrm>
+        <a:graphic>
+          <a:graphicData uri="http://schemas.openxmlformats.org/drawingml/2006/table">
+            <a:tbl>
+              <a:tblPr firstRow="1" bandRow="1">
+                <a:tableStyleId>{5C22544A-7EE6-4342-B048-85BDC9FD1C3A}</a:tableStyleId>
+              </a:tblPr>
+              <a:tblGrid>
+                <a:gridCol w="2709333">
+                  <a:extLst>
+                    <a:ext uri="{9D8B030D-6E8A-4147-A177-3AD203B41FA5}">
+                      <a16:colId xmlns:a16="http://schemas.microsoft.com/office/drawing/2014/main" val="3498176026"/>
+                    </a:ext>
+                  </a:extLst>
+                </a:gridCol>
+                <a:gridCol w="2709333">
+                  <a:extLst>
+                    <a:ext uri="{9D8B030D-6E8A-4147-A177-3AD203B41FA5}">
+                      <a16:colId xmlns:a16="http://schemas.microsoft.com/office/drawing/2014/main" val="3351629710"/>
+                    </a:ext>
+                  </a:extLst>
+                </a:gridCol>
+                <a:gridCol w="2709333">
+                  <a:extLst>
+                    <a:ext uri="{9D8B030D-6E8A-4147-A177-3AD203B41FA5}">
+                      <a16:colId xmlns:a16="http://schemas.microsoft.com/office/drawing/2014/main" val="1876934969"/>
+                    </a:ext>
+                  </a:extLst>
+                </a:gridCol>
+              </a:tblGrid>
+              <a:tr h="370840">
+                <a:tc>
+                  <a:txBody>
+                    <a:bodyPr/>
+                    <a:lstStyle/>
+                    <a:p>
+                      <a:endParaRPr lang="en-US"/>
+                    </a:p>
+                  </a:txBody>
+                  <a:tcPr/>
+                </a:tc>
+                <a:tc>
+                  <a:txBody>
+                    <a:bodyPr/>
+                    <a:lstStyle/>
+                    <a:p>
+                      <a:endParaRPr lang="en-US"/>
+                    </a:p>
+                  </a:txBody>
+                  <a:tcPr/>
+                </a:tc>
+                <a:tc>
+                  <a:txBody>
+                    <a:bodyPr/>
+                    <a:lstStyle/>
+                    <a:p>
+                      <a:endParaRPr lang="en-US"/>
+                    </a:p>
+                  </a:txBody>
+                  <a:tcPr/>
+                </a:tc>
+                <a:extLst>
+                  <a:ext uri="{0D108BD9-81ED-4DB2-BD59-A6C34878D82A}">
+                    <a16:rowId xmlns:a16="http://schemas.microsoft.com/office/drawing/2014/main" val="2619881943"/>
+                  </a:ext>
+                </a:extLst>
+              </a:tr>
+              <a:tr h="370840">
+                <a:tc>
+                  <a:txBody>
+                    <a:bodyPr/>
+                    <a:lstStyle/>
+                    <a:p>
+                      <a:endParaRPr lang="en-US"/>
+                    </a:p>
+                  </a:txBody>
+                  <a:tcPr/>
+                </a:tc>
+                <a:tc>
+                  <a:txBody>
+                    <a:bodyPr/>
+                    <a:lstStyle/>
+                    <a:p>
+                      <a:endParaRPr lang="en-US"/>
+                    </a:p>
+                  </a:txBody>
+                  <a:tcPr/>
+                </a:tc>
+                <a:tc>
+                  <a:txBody>
+                    <a:bodyPr/>
+                    <a:lstStyle/>
+                    <a:p>
+                      <a:endParaRPr lang="en-US"/>
+                    </a:p>
+                  </a:txBody>
+                  <a:tcPr/>
+                </a:tc>
+                <a:extLst>
+                  <a:ext uri="{0D108BD9-81ED-4DB2-BD59-A6C34878D82A}">
+                    <a16:rowId xmlns:a16="http://schemas.microsoft.com/office/drawing/2014/main" val="4097673953"/>
+                  </a:ext>
+                </a:extLst>
+              </a:tr>
+            </a:tbl>
+          </a:graphicData>
+        </a:graphic>
+      </p:graphicFrame>
     </p:spTree>
     <p:extLst>
       <p:ext uri="{BB962C8B-B14F-4D97-AF65-F5344CB8AC3E}">

</xml_diff>